<commit_message>
Changed  details about andriod studio
</commit_message>
<xml_diff>
--- a/Mobile_testing_installation process.pptx
+++ b/Mobile_testing_installation process.pptx
@@ -289,7 +289,7 @@
           <a:p>
             <a:fld id="{27D6577E-EB25-48F5-849C-58DC64960D09}" type="datetimeFigureOut">
               <a:rPr lang="en-US" smtClean="0"/>
-              <a:t>9/13/2018</a:t>
+              <a:t>9/21/2018</a:t>
             </a:fld>
             <a:endParaRPr lang="en-US"/>
           </a:p>
@@ -619,7 +619,7 @@
           <a:p>
             <a:fld id="{27D6577E-EB25-48F5-849C-58DC64960D09}" type="datetimeFigureOut">
               <a:rPr lang="en-US" smtClean="0"/>
-              <a:t>9/13/2018</a:t>
+              <a:t>9/21/2018</a:t>
             </a:fld>
             <a:endParaRPr lang="en-US"/>
           </a:p>
@@ -799,7 +799,7 @@
           <a:p>
             <a:fld id="{27D6577E-EB25-48F5-849C-58DC64960D09}" type="datetimeFigureOut">
               <a:rPr lang="en-US" smtClean="0"/>
-              <a:t>9/13/2018</a:t>
+              <a:t>9/21/2018</a:t>
             </a:fld>
             <a:endParaRPr lang="en-US"/>
           </a:p>
@@ -969,7 +969,7 @@
           <a:p>
             <a:fld id="{27D6577E-EB25-48F5-849C-58DC64960D09}" type="datetimeFigureOut">
               <a:rPr lang="en-US" smtClean="0"/>
-              <a:t>9/13/2018</a:t>
+              <a:t>9/21/2018</a:t>
             </a:fld>
             <a:endParaRPr lang="en-US"/>
           </a:p>
@@ -1246,7 +1246,7 @@
           <a:p>
             <a:fld id="{27D6577E-EB25-48F5-849C-58DC64960D09}" type="datetimeFigureOut">
               <a:rPr lang="en-US" smtClean="0"/>
-              <a:t>9/13/2018</a:t>
+              <a:t>9/21/2018</a:t>
             </a:fld>
             <a:endParaRPr lang="en-US"/>
           </a:p>
@@ -1640,7 +1640,7 @@
           <a:p>
             <a:fld id="{27D6577E-EB25-48F5-849C-58DC64960D09}" type="datetimeFigureOut">
               <a:rPr lang="en-US" smtClean="0"/>
-              <a:t>9/13/2018</a:t>
+              <a:t>9/21/2018</a:t>
             </a:fld>
             <a:endParaRPr lang="en-US"/>
           </a:p>
@@ -2117,7 +2117,7 @@
           <a:p>
             <a:fld id="{27D6577E-EB25-48F5-849C-58DC64960D09}" type="datetimeFigureOut">
               <a:rPr lang="en-US" smtClean="0"/>
-              <a:t>9/13/2018</a:t>
+              <a:t>9/21/2018</a:t>
             </a:fld>
             <a:endParaRPr lang="en-US"/>
           </a:p>
@@ -2235,7 +2235,7 @@
           <a:p>
             <a:fld id="{27D6577E-EB25-48F5-849C-58DC64960D09}" type="datetimeFigureOut">
               <a:rPr lang="en-US" smtClean="0"/>
-              <a:t>9/13/2018</a:t>
+              <a:t>9/21/2018</a:t>
             </a:fld>
             <a:endParaRPr lang="en-US"/>
           </a:p>
@@ -2330,7 +2330,7 @@
           <a:p>
             <a:fld id="{27D6577E-EB25-48F5-849C-58DC64960D09}" type="datetimeFigureOut">
               <a:rPr lang="en-US" smtClean="0"/>
-              <a:t>9/13/2018</a:t>
+              <a:t>9/21/2018</a:t>
             </a:fld>
             <a:endParaRPr lang="en-US"/>
           </a:p>
@@ -2676,7 +2676,7 @@
           <a:p>
             <a:fld id="{27D6577E-EB25-48F5-849C-58DC64960D09}" type="datetimeFigureOut">
               <a:rPr lang="en-US" smtClean="0"/>
-              <a:t>9/13/2018</a:t>
+              <a:t>9/21/2018</a:t>
             </a:fld>
             <a:endParaRPr lang="en-US"/>
           </a:p>
@@ -3064,7 +3064,7 @@
           <a:p>
             <a:fld id="{27D6577E-EB25-48F5-849C-58DC64960D09}" type="datetimeFigureOut">
               <a:rPr lang="en-US" smtClean="0"/>
-              <a:t>9/13/2018</a:t>
+              <a:t>9/21/2018</a:t>
             </a:fld>
             <a:endParaRPr lang="en-US"/>
           </a:p>
@@ -3342,7 +3342,7 @@
           <a:p>
             <a:fld id="{27D6577E-EB25-48F5-849C-58DC64960D09}" type="datetimeFigureOut">
               <a:rPr lang="en-US" smtClean="0"/>
-              <a:t>9/13/2018</a:t>
+              <a:t>9/21/2018</a:t>
             </a:fld>
             <a:endParaRPr lang="en-US"/>
           </a:p>
@@ -4203,7 +4203,7 @@
             </a:pPr>
             <a:r>
               <a:rPr lang="en-NZ" sz="1900" dirty="0"/>
-              <a:t>Open source GUI to install APPIUM server </a:t>
+              <a:t>Contains lot of tools  to create Android apps from scratch</a:t>
             </a:r>
           </a:p>
           <a:p>
@@ -4212,15 +4212,9 @@
               <a:buChar char="•"/>
             </a:pPr>
             <a:r>
-              <a:rPr lang="en-NZ" sz="1900" dirty="0"/>
-              <a:t>Contains lot of tools  to create Android apps</a:t>
-            </a:r>
-          </a:p>
-          <a:p>
-            <a:pPr lvl="1" algn="just">
-              <a:buFont typeface="Arial" panose="020B0604020202020204" pitchFamily="34" charset="0"/>
-              <a:buChar char="•"/>
-            </a:pPr>
+              <a:rPr lang="en-NZ" sz="1900"/>
+              <a:t>For testing </a:t>
+            </a:r>
             <a:r>
               <a:rPr lang="en-NZ" sz="1900" dirty="0"/>
               <a:t>Appium need  SDK tools, Platform tools and build tools including ADB </a:t>

</xml_diff>